<commit_message>
Final version of dispersion presentation
</commit_message>
<xml_diff>
--- a/python/Dispersion.pptx
+++ b/python/Dispersion.pptx
@@ -464,6 +464,90 @@
     </a:lvl9pPr>
   </p:notesStyle>
 </p:notesMaster>
+</file>
+
+<file path=ppt/notesSlides/notesSlide1.xml><?xml version="1.0" encoding="utf-8"?>
+<p:notes xmlns:a="http://schemas.openxmlformats.org/drawingml/2006/main" xmlns:r="http://schemas.openxmlformats.org/officeDocument/2006/relationships" xmlns:p="http://schemas.openxmlformats.org/presentationml/2006/main">
+  <p:cSld>
+    <p:spTree>
+      <p:nvGrpSpPr>
+        <p:cNvPr id="1" name=""/>
+        <p:cNvGrpSpPr/>
+        <p:nvPr/>
+      </p:nvGrpSpPr>
+      <p:grpSpPr>
+        <a:xfrm>
+          <a:off x="0" y="0"/>
+          <a:ext cx="0" cy="0"/>
+          <a:chOff x="0" y="0"/>
+          <a:chExt cx="0" cy="0"/>
+        </a:xfrm>
+      </p:grpSpPr>
+      <p:sp>
+        <p:nvSpPr>
+          <p:cNvPr id="2" name="Slide Image Placeholder 1"/>
+          <p:cNvSpPr>
+            <a:spLocks noGrp="1" noRot="1" noChangeAspect="1"/>
+          </p:cNvSpPr>
+          <p:nvPr>
+            <p:ph type="sldImg"/>
+          </p:nvPr>
+        </p:nvSpPr>
+        <p:spPr/>
+      </p:sp>
+      <p:sp>
+        <p:nvSpPr>
+          <p:cNvPr id="3" name="Notes Placeholder 2"/>
+          <p:cNvSpPr>
+            <a:spLocks noGrp="1"/>
+          </p:cNvSpPr>
+          <p:nvPr>
+            <p:ph type="body" idx="1"/>
+          </p:nvPr>
+        </p:nvSpPr>
+        <p:spPr/>
+        <p:txBody>
+          <a:bodyPr/>
+          <a:lstStyle/>
+          <a:p>
+            <a:endParaRPr lang="en-US" dirty="0"/>
+          </a:p>
+        </p:txBody>
+      </p:sp>
+      <p:sp>
+        <p:nvSpPr>
+          <p:cNvPr id="4" name="Slide Number Placeholder 3"/>
+          <p:cNvSpPr>
+            <a:spLocks noGrp="1"/>
+          </p:cNvSpPr>
+          <p:nvPr>
+            <p:ph type="sldNum" sz="quarter" idx="5"/>
+          </p:nvPr>
+        </p:nvSpPr>
+        <p:spPr/>
+        <p:txBody>
+          <a:bodyPr/>
+          <a:lstStyle/>
+          <a:p>
+            <a:fld id="{5928C8F4-B81C-42CF-8521-957BF43F901A}" type="slidenum">
+              <a:rPr lang="en-US" smtClean="0"/>
+              <a:t>2</a:t>
+            </a:fld>
+            <a:endParaRPr lang="en-US"/>
+          </a:p>
+        </p:txBody>
+      </p:sp>
+    </p:spTree>
+    <p:extLst>
+      <p:ext uri="{BB962C8B-B14F-4D97-AF65-F5344CB8AC3E}">
+        <p14:creationId xmlns:p14="http://schemas.microsoft.com/office/powerpoint/2010/main" val="2454771144"/>
+      </p:ext>
+    </p:extLst>
+  </p:cSld>
+  <p:clrMapOvr>
+    <a:masterClrMapping/>
+  </p:clrMapOvr>
+</p:notes>
 </file>
 
 <file path=ppt/slideLayouts/slideLayout1.xml><?xml version="1.0" encoding="utf-8"?>
@@ -3592,12 +3676,12 @@
         <p:spPr>
           <a:xfrm>
             <a:off x="838200" y="1982642"/>
-            <a:ext cx="10515600" cy="4795229"/>
-          </a:xfrm>
-        </p:spPr>
-        <p:txBody>
-          <a:bodyPr numCol="2">
-            <a:normAutofit lnSpcReduction="10000"/>
+            <a:ext cx="10515600" cy="2909869"/>
+          </a:xfrm>
+        </p:spPr>
+        <p:txBody>
+          <a:bodyPr numCol="1">
+            <a:normAutofit/>
           </a:bodyPr>
           <a:lstStyle/>
           <a:p>
@@ -3649,7 +3733,7 @@
             </a:endParaRPr>
           </a:p>
           <a:p>
-            <a:endParaRPr lang="en-US" sz="1800" dirty="0"/>
+            <a:endParaRPr lang="en-US" sz="800" dirty="0"/>
           </a:p>
           <a:p>
             <a:r>
@@ -3698,225 +3782,6 @@
               <a:rPr lang="en-US" sz="1800" dirty="0"/>
               <a:t> graph)</a:t>
             </a:r>
-          </a:p>
-          <a:p>
-            <a:pPr marL="457200" lvl="1" indent="0">
-              <a:buNone/>
-            </a:pPr>
-            <a:endParaRPr lang="en-US" sz="1100" dirty="0">
-              <a:latin typeface="Bahnschrift Light" panose="020B0502040204020203" pitchFamily="34" charset="0"/>
-            </a:endParaRPr>
-          </a:p>
-          <a:p>
-            <a:pPr marL="457200" lvl="1" indent="0">
-              <a:buNone/>
-            </a:pPr>
-            <a:endParaRPr lang="en-US" sz="1100" dirty="0">
-              <a:latin typeface="Bahnschrift Light" panose="020B0502040204020203" pitchFamily="34" charset="0"/>
-            </a:endParaRPr>
-          </a:p>
-          <a:p>
-            <a:pPr marL="457200" lvl="1" indent="0">
-              <a:buNone/>
-            </a:pPr>
-            <a:endParaRPr lang="en-US" sz="1100" dirty="0">
-              <a:latin typeface="Bahnschrift Light" panose="020B0502040204020203" pitchFamily="34" charset="0"/>
-            </a:endParaRPr>
-          </a:p>
-          <a:p>
-            <a:pPr marL="457200" lvl="1" indent="0">
-              <a:buNone/>
-            </a:pPr>
-            <a:endParaRPr lang="en-US" sz="1100" dirty="0">
-              <a:latin typeface="Bahnschrift Light" panose="020B0502040204020203" pitchFamily="34" charset="0"/>
-            </a:endParaRPr>
-          </a:p>
-          <a:p>
-            <a:pPr marL="457200" lvl="1" indent="0">
-              <a:buNone/>
-            </a:pPr>
-            <a:endParaRPr lang="en-US" sz="1100" dirty="0">
-              <a:latin typeface="Bahnschrift Light" panose="020B0502040204020203" pitchFamily="34" charset="0"/>
-            </a:endParaRPr>
-          </a:p>
-          <a:p>
-            <a:pPr marL="457200" lvl="1" indent="0">
-              <a:buNone/>
-            </a:pPr>
-            <a:endParaRPr lang="en-US" sz="1100" dirty="0">
-              <a:latin typeface="Bahnschrift Light" panose="020B0502040204020203" pitchFamily="34" charset="0"/>
-            </a:endParaRPr>
-          </a:p>
-          <a:p>
-            <a:pPr marL="457200" lvl="1" indent="0">
-              <a:buNone/>
-            </a:pPr>
-            <a:endParaRPr lang="en-US" sz="1100" dirty="0">
-              <a:latin typeface="Bahnschrift Light" panose="020B0502040204020203" pitchFamily="34" charset="0"/>
-            </a:endParaRPr>
-          </a:p>
-          <a:p>
-            <a:pPr marL="457200" lvl="1" indent="0">
-              <a:buNone/>
-            </a:pPr>
-            <a:endParaRPr lang="en-US" sz="1100" dirty="0">
-              <a:latin typeface="Bahnschrift Light" panose="020B0502040204020203" pitchFamily="34" charset="0"/>
-            </a:endParaRPr>
-          </a:p>
-          <a:p>
-            <a:pPr marL="457200" lvl="1" indent="0">
-              <a:buNone/>
-            </a:pPr>
-            <a:endParaRPr lang="en-US" sz="2500" dirty="0">
-              <a:latin typeface="Bahnschrift Light" panose="020B0502040204020203" pitchFamily="34" charset="0"/>
-            </a:endParaRPr>
-          </a:p>
-          <a:p>
-            <a:pPr marL="457200" lvl="1" indent="0">
-              <a:buNone/>
-            </a:pPr>
-            <a:endParaRPr lang="en-US" sz="2500" dirty="0">
-              <a:latin typeface="Bahnschrift Light" panose="020B0502040204020203" pitchFamily="34" charset="0"/>
-            </a:endParaRPr>
-          </a:p>
-          <a:p>
-            <a:pPr lvl="1"/>
-            <a:endParaRPr lang="en-US" sz="1800" dirty="0"/>
-          </a:p>
-          <a:p>
-            <a:pPr lvl="1"/>
-            <a:endParaRPr lang="en-US" sz="1800" dirty="0"/>
-          </a:p>
-          <a:p>
-            <a:pPr lvl="1"/>
-            <a:endParaRPr lang="en-US" sz="1800" dirty="0"/>
-          </a:p>
-          <a:p>
-            <a:pPr lvl="1"/>
-            <a:endParaRPr lang="en-US" sz="1800" dirty="0"/>
-          </a:p>
-          <a:p>
-            <a:pPr lvl="1"/>
-            <a:endParaRPr lang="en-US" sz="1800" dirty="0"/>
-          </a:p>
-          <a:p>
-            <a:pPr lvl="1"/>
-            <a:endParaRPr lang="en-US" sz="1800" dirty="0"/>
-          </a:p>
-          <a:p>
-            <a:pPr lvl="1"/>
-            <a:endParaRPr lang="en-US" sz="1800" dirty="0"/>
-          </a:p>
-          <a:p>
-            <a:pPr lvl="1"/>
-            <a:r>
-              <a:rPr lang="en-US" sz="1800" dirty="0"/>
-              <a:t>Transfer function in (non-)dispersive media</a:t>
-            </a:r>
-          </a:p>
-          <a:p>
-            <a:pPr marL="457200" lvl="1" indent="0">
-              <a:buNone/>
-            </a:pPr>
-            <a:r>
-              <a:rPr lang="en-US" sz="2500" dirty="0">
-                <a:latin typeface="Bahnschrift Light" panose="020B0502040204020203" pitchFamily="34" charset="0"/>
-              </a:rPr>
-              <a:t>H = </a:t>
-            </a:r>
-            <a:r>
-              <a:rPr lang="en-US" sz="2500" dirty="0" err="1">
-                <a:latin typeface="Bahnschrift Light" panose="020B0502040204020203" pitchFamily="34" charset="0"/>
-              </a:rPr>
-              <a:t>np.exp</a:t>
-            </a:r>
-            <a:r>
-              <a:rPr lang="en-US" sz="2500" dirty="0">
-                <a:latin typeface="Bahnschrift Light" panose="020B0502040204020203" pitchFamily="34" charset="0"/>
-              </a:rPr>
-              <a:t>(-1j*</a:t>
-            </a:r>
-            <a:r>
-              <a:rPr lang="en-US" sz="2500" dirty="0" err="1">
-                <a:latin typeface="Bahnschrift Light" panose="020B0502040204020203" pitchFamily="34" charset="0"/>
-              </a:rPr>
-              <a:t>np.outer</a:t>
-            </a:r>
-            <a:r>
-              <a:rPr lang="en-US" sz="2500" dirty="0">
-                <a:latin typeface="Bahnschrift Light" panose="020B0502040204020203" pitchFamily="34" charset="0"/>
-              </a:rPr>
-              <a:t>(z, k))</a:t>
-            </a:r>
-          </a:p>
-          <a:p>
-            <a:pPr lvl="1"/>
-            <a:endParaRPr lang="en-US" sz="1800" dirty="0"/>
-          </a:p>
-          <a:p>
-            <a:pPr lvl="1"/>
-            <a:r>
-              <a:rPr lang="en-US" sz="1800" dirty="0"/>
-              <a:t>Product in frequency domain + FFT</a:t>
-            </a:r>
-            <a:endParaRPr lang="en-US" sz="1800" dirty="0">
-              <a:latin typeface="Bahnschrift Light" panose="020B0502040204020203" pitchFamily="34" charset="0"/>
-            </a:endParaRPr>
-          </a:p>
-          <a:p>
-            <a:pPr marL="457200" lvl="1" indent="0">
-              <a:buNone/>
-            </a:pPr>
-            <a:r>
-              <a:rPr lang="en-US" sz="2500" dirty="0">
-                <a:latin typeface="Bahnschrift Light" panose="020B0502040204020203" pitchFamily="34" charset="0"/>
-              </a:rPr>
-              <a:t>E = </a:t>
-            </a:r>
-            <a:r>
-              <a:rPr lang="en-US" sz="2500" dirty="0" err="1">
-                <a:latin typeface="Bahnschrift Light" panose="020B0502040204020203" pitchFamily="34" charset="0"/>
-              </a:rPr>
-              <a:t>np.fft.ifft</a:t>
-            </a:r>
-            <a:r>
-              <a:rPr lang="en-US" sz="2500" dirty="0">
-                <a:latin typeface="Bahnschrift Light" panose="020B0502040204020203" pitchFamily="34" charset="0"/>
-              </a:rPr>
-              <a:t>(</a:t>
-            </a:r>
-            <a:r>
-              <a:rPr lang="en-US" sz="2500" dirty="0" err="1">
-                <a:latin typeface="Bahnschrift Light" panose="020B0502040204020203" pitchFamily="34" charset="0"/>
-              </a:rPr>
-              <a:t>np.fft.fftshift</a:t>
-            </a:r>
-            <a:r>
-              <a:rPr lang="en-US" sz="2500" dirty="0">
-                <a:latin typeface="Bahnschrift Light" panose="020B0502040204020203" pitchFamily="34" charset="0"/>
-              </a:rPr>
-              <a:t>(H * </a:t>
-            </a:r>
-            <a:r>
-              <a:rPr lang="en-US" sz="2500" dirty="0" err="1">
-                <a:latin typeface="Bahnschrift Light" panose="020B0502040204020203" pitchFamily="34" charset="0"/>
-              </a:rPr>
-              <a:t>spect</a:t>
-            </a:r>
-            <a:r>
-              <a:rPr lang="en-US" sz="2500" dirty="0">
-                <a:latin typeface="Bahnschrift Light" panose="020B0502040204020203" pitchFamily="34" charset="0"/>
-              </a:rPr>
-              <a:t>, axes=1), norm='forward')</a:t>
-            </a:r>
-          </a:p>
-          <a:p>
-            <a:pPr marL="457200" lvl="1" indent="0">
-              <a:buNone/>
-            </a:pPr>
-            <a:endParaRPr lang="en-US" sz="1100" dirty="0">
-              <a:latin typeface="Bahnschrift Light" panose="020B0502040204020203" pitchFamily="34" charset="0"/>
-            </a:endParaRPr>
           </a:p>
         </p:txBody>
       </p:sp>
@@ -3929,7 +3794,7 @@
           <p:nvPr/>
         </p:nvPicPr>
         <p:blipFill>
-          <a:blip r:embed="rId2" cstate="print">
+          <a:blip r:embed="rId3" cstate="print">
             <a:extLst>
               <a:ext uri="{28A0092B-C50C-407E-A947-70E740481C1C}">
                 <a14:useLocalDpi xmlns:a14="http://schemas.microsoft.com/office/drawing/2010/main" val="0"/>
@@ -3965,7 +3830,7 @@
           <p:nvPr/>
         </p:nvPicPr>
         <p:blipFill>
-          <a:blip r:embed="rId3"/>
+          <a:blip r:embed="rId4"/>
           <a:stretch>
             <a:fillRect/>
           </a:stretch>
@@ -3995,7 +3860,7 @@
           <p:nvPr/>
         </p:nvPicPr>
         <p:blipFill>
-          <a:blip r:embed="rId4"/>
+          <a:blip r:embed="rId5"/>
           <a:stretch>
             <a:fillRect/>
           </a:stretch>
@@ -4025,7 +3890,7 @@
           <p:nvPr/>
         </p:nvPicPr>
         <p:blipFill>
-          <a:blip r:embed="rId5"/>
+          <a:blip r:embed="rId6"/>
           <a:stretch>
             <a:fillRect/>
           </a:stretch>
@@ -4055,7 +3920,7 @@
           <p:nvPr/>
         </p:nvPicPr>
         <p:blipFill>
-          <a:blip r:embed="rId6"/>
+          <a:blip r:embed="rId7"/>
           <a:stretch>
             <a:fillRect/>
           </a:stretch>
@@ -4070,6 +3935,189 @@
           </a:prstGeom>
         </p:spPr>
       </p:pic>
+      <p:sp>
+        <p:nvSpPr>
+          <p:cNvPr id="4" name="TextBox 3">
+            <a:extLst>
+              <a:ext uri="{FF2B5EF4-FFF2-40B4-BE49-F238E27FC236}">
+                <a16:creationId xmlns:a16="http://schemas.microsoft.com/office/drawing/2014/main" id="{6FCF582D-C44F-48B1-821C-12F5A0B5D454}"/>
+              </a:ext>
+            </a:extLst>
+          </p:cNvPr>
+          <p:cNvSpPr txBox="1"/>
+          <p:nvPr/>
+        </p:nvSpPr>
+        <p:spPr>
+          <a:xfrm>
+            <a:off x="450734" y="4900924"/>
+            <a:ext cx="5090474" cy="1615827"/>
+          </a:xfrm>
+          <a:prstGeom prst="rect">
+            <a:avLst/>
+          </a:prstGeom>
+          <a:noFill/>
+        </p:spPr>
+        <p:txBody>
+          <a:bodyPr wrap="square" rtlCol="0">
+            <a:spAutoFit/>
+          </a:bodyPr>
+          <a:lstStyle/>
+          <a:p>
+            <a:pPr lvl="1"/>
+            <a:endParaRPr lang="en-US" dirty="0"/>
+          </a:p>
+          <a:p>
+            <a:pPr lvl="1"/>
+            <a:r>
+              <a:rPr lang="en-US" b="1" dirty="0"/>
+              <a:t>Transfer function in (non-)dispersive media</a:t>
+            </a:r>
+          </a:p>
+          <a:p>
+            <a:pPr lvl="1"/>
+            <a:endParaRPr lang="en-US" sz="1500" dirty="0">
+              <a:latin typeface="Bahnschrift Light" panose="020B0502040204020203" pitchFamily="34" charset="0"/>
+            </a:endParaRPr>
+          </a:p>
+          <a:p>
+            <a:pPr lvl="1"/>
+            <a:r>
+              <a:rPr lang="en-US" sz="1500" dirty="0">
+                <a:latin typeface="Bahnschrift Light" panose="020B0502040204020203" pitchFamily="34" charset="0"/>
+              </a:rPr>
+              <a:t>H = </a:t>
+            </a:r>
+            <a:r>
+              <a:rPr lang="en-US" sz="1500" dirty="0" err="1">
+                <a:latin typeface="Bahnschrift Light" panose="020B0502040204020203" pitchFamily="34" charset="0"/>
+              </a:rPr>
+              <a:t>np.exp</a:t>
+            </a:r>
+            <a:r>
+              <a:rPr lang="en-US" sz="1500" dirty="0">
+                <a:latin typeface="Bahnschrift Light" panose="020B0502040204020203" pitchFamily="34" charset="0"/>
+              </a:rPr>
+              <a:t>(-1j*</a:t>
+            </a:r>
+            <a:r>
+              <a:rPr lang="en-US" sz="1500" dirty="0" err="1">
+                <a:latin typeface="Bahnschrift Light" panose="020B0502040204020203" pitchFamily="34" charset="0"/>
+              </a:rPr>
+              <a:t>np.outer</a:t>
+            </a:r>
+            <a:r>
+              <a:rPr lang="en-US" sz="1500" dirty="0">
+                <a:latin typeface="Bahnschrift Light" panose="020B0502040204020203" pitchFamily="34" charset="0"/>
+              </a:rPr>
+              <a:t>(z, k))</a:t>
+            </a:r>
+          </a:p>
+          <a:p>
+            <a:pPr lvl="1"/>
+            <a:endParaRPr lang="en-US" sz="1500" dirty="0"/>
+          </a:p>
+          <a:p>
+            <a:endParaRPr lang="en-US" dirty="0"/>
+          </a:p>
+        </p:txBody>
+      </p:sp>
+      <p:sp>
+        <p:nvSpPr>
+          <p:cNvPr id="5" name="TextBox 4">
+            <a:extLst>
+              <a:ext uri="{FF2B5EF4-FFF2-40B4-BE49-F238E27FC236}">
+                <a16:creationId xmlns:a16="http://schemas.microsoft.com/office/drawing/2014/main" id="{903D6225-F8E9-4E6B-B855-3ECD88015301}"/>
+              </a:ext>
+            </a:extLst>
+          </p:cNvPr>
+          <p:cNvSpPr txBox="1"/>
+          <p:nvPr/>
+        </p:nvSpPr>
+        <p:spPr>
+          <a:xfrm>
+            <a:off x="5260157" y="5208243"/>
+            <a:ext cx="5891752" cy="1107996"/>
+          </a:xfrm>
+          <a:prstGeom prst="rect">
+            <a:avLst/>
+          </a:prstGeom>
+          <a:noFill/>
+        </p:spPr>
+        <p:txBody>
+          <a:bodyPr wrap="square" rtlCol="0">
+            <a:spAutoFit/>
+          </a:bodyPr>
+          <a:lstStyle/>
+          <a:p>
+            <a:pPr lvl="1"/>
+            <a:r>
+              <a:rPr lang="en-US" b="1" dirty="0"/>
+              <a:t>Product in frequency domain + IFFT</a:t>
+            </a:r>
+            <a:endParaRPr lang="en-US" b="1" dirty="0">
+              <a:latin typeface="Bahnschrift Light" panose="020B0502040204020203" pitchFamily="34" charset="0"/>
+            </a:endParaRPr>
+          </a:p>
+          <a:p>
+            <a:pPr marL="457200" lvl="1" indent="0">
+              <a:buNone/>
+            </a:pPr>
+            <a:endParaRPr lang="en-US" sz="1500" dirty="0">
+              <a:latin typeface="Bahnschrift Light" panose="020B0502040204020203" pitchFamily="34" charset="0"/>
+            </a:endParaRPr>
+          </a:p>
+          <a:p>
+            <a:pPr marL="457200" lvl="1" indent="0">
+              <a:buNone/>
+            </a:pPr>
+            <a:r>
+              <a:rPr lang="en-US" sz="1500" dirty="0">
+                <a:latin typeface="Bahnschrift Light" panose="020B0502040204020203" pitchFamily="34" charset="0"/>
+              </a:rPr>
+              <a:t>E = </a:t>
+            </a:r>
+            <a:r>
+              <a:rPr lang="en-US" sz="1500" dirty="0" err="1">
+                <a:latin typeface="Bahnschrift Light" panose="020B0502040204020203" pitchFamily="34" charset="0"/>
+              </a:rPr>
+              <a:t>np.fft.ifft</a:t>
+            </a:r>
+            <a:r>
+              <a:rPr lang="en-US" sz="1500" dirty="0">
+                <a:latin typeface="Bahnschrift Light" panose="020B0502040204020203" pitchFamily="34" charset="0"/>
+              </a:rPr>
+              <a:t>(</a:t>
+            </a:r>
+            <a:r>
+              <a:rPr lang="en-US" sz="1500" dirty="0" err="1">
+                <a:latin typeface="Bahnschrift Light" panose="020B0502040204020203" pitchFamily="34" charset="0"/>
+              </a:rPr>
+              <a:t>np.fft.fftshift</a:t>
+            </a:r>
+            <a:r>
+              <a:rPr lang="en-US" sz="1500" dirty="0">
+                <a:latin typeface="Bahnschrift Light" panose="020B0502040204020203" pitchFamily="34" charset="0"/>
+              </a:rPr>
+              <a:t>(H * </a:t>
+            </a:r>
+            <a:r>
+              <a:rPr lang="en-US" sz="1500" dirty="0" err="1">
+                <a:latin typeface="Bahnschrift Light" panose="020B0502040204020203" pitchFamily="34" charset="0"/>
+              </a:rPr>
+              <a:t>spect</a:t>
+            </a:r>
+            <a:r>
+              <a:rPr lang="en-US" sz="1500" dirty="0">
+                <a:latin typeface="Bahnschrift Light" panose="020B0502040204020203" pitchFamily="34" charset="0"/>
+              </a:rPr>
+              <a:t>, axes=1), norm='forward')</a:t>
+            </a:r>
+          </a:p>
+          <a:p>
+            <a:endParaRPr lang="en-US" dirty="0"/>
+          </a:p>
+        </p:txBody>
+      </p:sp>
     </p:spTree>
     <p:extLst>
       <p:ext uri="{BB962C8B-B14F-4D97-AF65-F5344CB8AC3E}">
@@ -4112,7 +4160,7 @@
         </p:nvSpPr>
         <p:spPr>
           <a:xfrm>
-            <a:off x="838200" y="1046581"/>
+            <a:off x="838200" y="980592"/>
             <a:ext cx="10515600" cy="754944"/>
           </a:xfrm>
         </p:spPr>
@@ -4154,8 +4202,8 @@
         </p:blipFill>
         <p:spPr>
           <a:xfrm>
-            <a:off x="609600" y="2161742"/>
-            <a:ext cx="5486400" cy="4114800"/>
+            <a:off x="0" y="1622415"/>
+            <a:ext cx="4121319" cy="3090989"/>
           </a:xfrm>
         </p:spPr>
       </p:pic>
@@ -4181,8 +4229,8 @@
         </p:blipFill>
         <p:spPr>
           <a:xfrm>
-            <a:off x="6096000" y="2161742"/>
-            <a:ext cx="5486400" cy="4114800"/>
+            <a:off x="3810001" y="2422207"/>
+            <a:ext cx="4121318" cy="3090988"/>
           </a:xfrm>
           <a:prstGeom prst="rect">
             <a:avLst/>
@@ -4213,6 +4261,42 @@
           <a:xfrm>
             <a:off x="450734" y="301931"/>
             <a:ext cx="2743200" cy="633813"/>
+          </a:xfrm>
+          <a:prstGeom prst="rect">
+            <a:avLst/>
+          </a:prstGeom>
+        </p:spPr>
+      </p:pic>
+      <p:pic>
+        <p:nvPicPr>
+          <p:cNvPr id="4" name="Picture 3" descr="Une image contenant texte, capture d’écran, diagramme, Tracé&#10;&#10;Description automatically generated">
+            <a:extLst>
+              <a:ext uri="{FF2B5EF4-FFF2-40B4-BE49-F238E27FC236}">
+                <a16:creationId xmlns:a16="http://schemas.microsoft.com/office/drawing/2014/main" id="{B7828D92-21E4-4B70-B92B-799199ADC0DE}"/>
+              </a:ext>
+            </a:extLst>
+          </p:cNvPr>
+          <p:cNvPicPr>
+            <a:picLocks noChangeAspect="1"/>
+          </p:cNvPicPr>
+          <p:nvPr/>
+        </p:nvPicPr>
+        <p:blipFill>
+          <a:blip r:embed="rId5">
+            <a:extLst>
+              <a:ext uri="{28A0092B-C50C-407E-A947-70E740481C1C}">
+                <a14:useLocalDpi xmlns:a14="http://schemas.microsoft.com/office/drawing/2010/main" val="0"/>
+              </a:ext>
+            </a:extLst>
+          </a:blip>
+          <a:stretch>
+            <a:fillRect/>
+          </a:stretch>
+        </p:blipFill>
+        <p:spPr>
+          <a:xfrm>
+            <a:off x="7620000" y="3429000"/>
+            <a:ext cx="4572000" cy="3429000"/>
           </a:xfrm>
           <a:prstGeom prst="rect">
             <a:avLst/>

</xml_diff>